<commit_message>
Updates - Added Example 1
</commit_message>
<xml_diff>
--- a/Presentation.pptx
+++ b/Presentation.pptx
@@ -5,7 +5,7 @@
     <p:sldMasterId id="2147483648" r:id="rId1"/>
   </p:sldMasterIdLst>
   <p:notesMasterIdLst>
-    <p:notesMasterId r:id="rId13"/>
+    <p:notesMasterId r:id="rId16"/>
   </p:notesMasterIdLst>
   <p:sldIdLst>
     <p:sldId id="256" r:id="rId2"/>
@@ -17,8 +17,11 @@
     <p:sldId id="260" r:id="rId8"/>
     <p:sldId id="263" r:id="rId9"/>
     <p:sldId id="261" r:id="rId10"/>
-    <p:sldId id="264" r:id="rId11"/>
-    <p:sldId id="267" r:id="rId12"/>
+    <p:sldId id="268" r:id="rId11"/>
+    <p:sldId id="269" r:id="rId12"/>
+    <p:sldId id="270" r:id="rId13"/>
+    <p:sldId id="264" r:id="rId14"/>
+    <p:sldId id="267" r:id="rId15"/>
   </p:sldIdLst>
   <p:sldSz cx="9144000" cy="6858000" type="screen4x3"/>
   <p:notesSz cx="6858000" cy="9144000"/>
@@ -3627,17 +3630,15 @@
           <a:lstStyle/>
           <a:p>
             <a:r>
-              <a:rPr lang="en-US" dirty="0" err="1" smtClean="0"/>
-              <a:t>global.R</a:t>
-            </a:r>
-            <a:r>
               <a:rPr lang="en-US" dirty="0" smtClean="0"/>
-              <a:t> is</a:t>
+              <a:t>Shiny is a</a:t>
             </a:r>
             <a:r>
               <a:rPr lang="en-US" baseline="0" dirty="0" smtClean="0"/>
-              <a:t> read upon application execution and provides data read or variables to both the UI and the Server. This can be useful when you want to display something directly from a variable into the UI, or in my case, I use it to allow anyone using the application to see the exact same data no matter who runs the application when there are multiple users. </a:t>
-            </a:r>
+              <a:t> web framework/portal to the R language. Everything you do in a Shiny application goes back and executes some sort of R code to filter data, display a new chart, modify a plot, etc.. </a:t>
+            </a:r>
+          </a:p>
+          <a:p>
             <a:endParaRPr lang="en-US" dirty="0"/>
           </a:p>
         </p:txBody>
@@ -3659,7 +3660,7 @@
           <a:p>
             <a:fld id="{8AE7EE44-CD9C-CF4A-9731-BC6225750AAF}" type="slidenum">
               <a:rPr lang="en-US" smtClean="0"/>
-              <a:t>8</a:t>
+              <a:t>2</a:t>
             </a:fld>
             <a:endParaRPr lang="en-US"/>
           </a:p>
@@ -3668,7 +3669,7 @@
     </p:spTree>
     <p:extLst>
       <p:ext uri="{BB962C8B-B14F-4D97-AF65-F5344CB8AC3E}">
-        <p14:creationId xmlns:p14="http://schemas.microsoft.com/office/powerpoint/2010/main" val="4033503553"/>
+        <p14:creationId xmlns:p14="http://schemas.microsoft.com/office/powerpoint/2010/main" val="4198288949"/>
       </p:ext>
     </p:extLst>
   </p:cSld>
@@ -3724,6 +3725,287 @@
           <a:p>
             <a:r>
               <a:rPr lang="en-US" dirty="0" smtClean="0"/>
+              <a:t>Shiny is a</a:t>
+            </a:r>
+            <a:r>
+              <a:rPr lang="en-US" baseline="0" dirty="0" smtClean="0"/>
+              <a:t> web framework/portal to the R language. Everything you do in a Shiny application goes back and executes some sort of R code to filter data, display a new chart, modify a plot, etc.. </a:t>
+            </a:r>
+          </a:p>
+          <a:p>
+            <a:r>
+              <a:rPr lang="en-US" baseline="0" dirty="0" smtClean="0"/>
+              <a:t>This also provides a simple syntax for interacting with HTML and web development so you do not have a be a web developer to create a nice application (though, some HTML experience is nice to have)</a:t>
+            </a:r>
+          </a:p>
+          <a:p>
+            <a:r>
+              <a:rPr lang="en-US" baseline="0" dirty="0" smtClean="0"/>
+              <a:t>When you run a shiny app locally, you desktop or laptop acts as a web server to serve out the application. You can deploy your application to other services on the Web, however for others to use them.</a:t>
+            </a:r>
+          </a:p>
+          <a:p>
+            <a:endParaRPr lang="en-US" baseline="0" dirty="0" smtClean="0"/>
+          </a:p>
+        </p:txBody>
+      </p:sp>
+      <p:sp>
+        <p:nvSpPr>
+          <p:cNvPr id="4" name="Slide Number Placeholder 3"/>
+          <p:cNvSpPr>
+            <a:spLocks noGrp="1"/>
+          </p:cNvSpPr>
+          <p:nvPr>
+            <p:ph type="sldNum" sz="quarter" idx="10"/>
+          </p:nvPr>
+        </p:nvSpPr>
+        <p:spPr/>
+        <p:txBody>
+          <a:bodyPr/>
+          <a:lstStyle/>
+          <a:p>
+            <a:fld id="{8AE7EE44-CD9C-CF4A-9731-BC6225750AAF}" type="slidenum">
+              <a:rPr lang="en-US" smtClean="0"/>
+              <a:t>3</a:t>
+            </a:fld>
+            <a:endParaRPr lang="en-US"/>
+          </a:p>
+        </p:txBody>
+      </p:sp>
+    </p:spTree>
+    <p:extLst>
+      <p:ext uri="{BB962C8B-B14F-4D97-AF65-F5344CB8AC3E}">
+        <p14:creationId xmlns:p14="http://schemas.microsoft.com/office/powerpoint/2010/main" val="2782799149"/>
+      </p:ext>
+    </p:extLst>
+  </p:cSld>
+  <p:clrMapOvr>
+    <a:masterClrMapping/>
+  </p:clrMapOvr>
+</p:notes>
+</file>
+
+<file path=ppt/notesSlides/notesSlide3.xml><?xml version="1.0" encoding="utf-8"?>
+<p:notes xmlns:a="http://schemas.openxmlformats.org/drawingml/2006/main" xmlns:r="http://schemas.openxmlformats.org/officeDocument/2006/relationships" xmlns:p="http://schemas.openxmlformats.org/presentationml/2006/main">
+  <p:cSld>
+    <p:spTree>
+      <p:nvGrpSpPr>
+        <p:cNvPr id="1" name=""/>
+        <p:cNvGrpSpPr/>
+        <p:nvPr/>
+      </p:nvGrpSpPr>
+      <p:grpSpPr>
+        <a:xfrm>
+          <a:off x="0" y="0"/>
+          <a:ext cx="0" cy="0"/>
+          <a:chOff x="0" y="0"/>
+          <a:chExt cx="0" cy="0"/>
+        </a:xfrm>
+      </p:grpSpPr>
+      <p:sp>
+        <p:nvSpPr>
+          <p:cNvPr id="2" name="Slide Image Placeholder 1"/>
+          <p:cNvSpPr>
+            <a:spLocks noGrp="1" noRot="1" noChangeAspect="1"/>
+          </p:cNvSpPr>
+          <p:nvPr>
+            <p:ph type="sldImg"/>
+          </p:nvPr>
+        </p:nvSpPr>
+        <p:spPr/>
+      </p:sp>
+      <p:sp>
+        <p:nvSpPr>
+          <p:cNvPr id="3" name="Notes Placeholder 2"/>
+          <p:cNvSpPr>
+            <a:spLocks noGrp="1"/>
+          </p:cNvSpPr>
+          <p:nvPr>
+            <p:ph type="body" idx="1"/>
+          </p:nvPr>
+        </p:nvSpPr>
+        <p:spPr/>
+        <p:txBody>
+          <a:bodyPr/>
+          <a:lstStyle/>
+          <a:p>
+            <a:r>
+              <a:rPr lang="en-US" dirty="0" smtClean="0"/>
+              <a:t>Objects defined in </a:t>
+            </a:r>
+            <a:r>
+              <a:rPr lang="en-US" dirty="0" err="1" smtClean="0"/>
+              <a:t>global.R</a:t>
+            </a:r>
+            <a:r>
+              <a:rPr lang="en-US" dirty="0" smtClean="0"/>
+              <a:t> are similar to those defined in </a:t>
+            </a:r>
+            <a:r>
+              <a:rPr lang="en-US" dirty="0" err="1" smtClean="0"/>
+              <a:t>server.R</a:t>
+            </a:r>
+            <a:r>
+              <a:rPr lang="en-US" dirty="0" smtClean="0"/>
+              <a:t> outside </a:t>
+            </a:r>
+            <a:r>
+              <a:rPr lang="en-US" dirty="0" err="1" smtClean="0"/>
+              <a:t>shinyServer</a:t>
+            </a:r>
+            <a:r>
+              <a:rPr lang="en-US" dirty="0" smtClean="0"/>
+              <a:t>(), with one important difference: they are also visible to the code in </a:t>
+            </a:r>
+            <a:r>
+              <a:rPr lang="en-US" dirty="0" err="1" smtClean="0"/>
+              <a:t>ui.R</a:t>
+            </a:r>
+            <a:r>
+              <a:rPr lang="en-US" dirty="0" smtClean="0"/>
+              <a:t>. This is because they are loaded into the global environment of the R session; all R code in a Shiny app is run in the global environment or a child of it.</a:t>
+            </a:r>
+          </a:p>
+          <a:p>
+            <a:r>
+              <a:rPr lang="en-US" dirty="0" smtClean="0"/>
+              <a:t>In practice, there aren’t many times where it’s necessary to share variables between </a:t>
+            </a:r>
+            <a:r>
+              <a:rPr lang="en-US" dirty="0" err="1" smtClean="0"/>
+              <a:t>server.R</a:t>
+            </a:r>
+            <a:r>
+              <a:rPr lang="en-US" dirty="0" smtClean="0"/>
+              <a:t> and </a:t>
+            </a:r>
+            <a:r>
+              <a:rPr lang="en-US" dirty="0" err="1" smtClean="0"/>
+              <a:t>ui.R</a:t>
+            </a:r>
+            <a:r>
+              <a:rPr lang="en-US" dirty="0" smtClean="0"/>
+              <a:t>. The code in </a:t>
+            </a:r>
+            <a:r>
+              <a:rPr lang="en-US" dirty="0" err="1" smtClean="0"/>
+              <a:t>ui.R</a:t>
+            </a:r>
+            <a:r>
+              <a:rPr lang="en-US" dirty="0" smtClean="0"/>
+              <a:t> is run once, when the Shiny app is started and it generates an HTML file which is cached and sent to each web browser that connects. This may be useful for setting some shared configuration options.</a:t>
+            </a:r>
+          </a:p>
+          <a:p>
+            <a:endParaRPr lang="en-US" dirty="0" smtClean="0"/>
+          </a:p>
+          <a:p>
+            <a:r>
+              <a:rPr lang="en-US" dirty="0" smtClean="0"/>
+              <a:t>The reason I have used it</a:t>
+            </a:r>
+            <a:r>
+              <a:rPr lang="en-US" baseline="0" dirty="0" smtClean="0"/>
+              <a:t> in the past is when I need to make sure that all users accessing the application at the same time see the same thing when a </a:t>
+            </a:r>
+            <a:r>
+              <a:rPr lang="en-US" baseline="0" dirty="0" err="1" smtClean="0"/>
+              <a:t>reactiveFileReader</a:t>
+            </a:r>
+            <a:r>
+              <a:rPr lang="en-US" baseline="0" dirty="0" smtClean="0"/>
+              <a:t>() updates a </a:t>
+            </a:r>
+            <a:r>
+              <a:rPr lang="en-US" baseline="0" smtClean="0"/>
+              <a:t>data file. </a:t>
+            </a:r>
+            <a:endParaRPr lang="en-US" dirty="0"/>
+          </a:p>
+        </p:txBody>
+      </p:sp>
+      <p:sp>
+        <p:nvSpPr>
+          <p:cNvPr id="4" name="Slide Number Placeholder 3"/>
+          <p:cNvSpPr>
+            <a:spLocks noGrp="1"/>
+          </p:cNvSpPr>
+          <p:nvPr>
+            <p:ph type="sldNum" sz="quarter" idx="10"/>
+          </p:nvPr>
+        </p:nvSpPr>
+        <p:spPr/>
+        <p:txBody>
+          <a:bodyPr/>
+          <a:lstStyle/>
+          <a:p>
+            <a:fld id="{8AE7EE44-CD9C-CF4A-9731-BC6225750AAF}" type="slidenum">
+              <a:rPr lang="en-US" smtClean="0"/>
+              <a:t>8</a:t>
+            </a:fld>
+            <a:endParaRPr lang="en-US"/>
+          </a:p>
+        </p:txBody>
+      </p:sp>
+    </p:spTree>
+    <p:extLst>
+      <p:ext uri="{BB962C8B-B14F-4D97-AF65-F5344CB8AC3E}">
+        <p14:creationId xmlns:p14="http://schemas.microsoft.com/office/powerpoint/2010/main" val="4033503553"/>
+      </p:ext>
+    </p:extLst>
+  </p:cSld>
+  <p:clrMapOvr>
+    <a:masterClrMapping/>
+  </p:clrMapOvr>
+</p:notes>
+</file>
+
+<file path=ppt/notesSlides/notesSlide4.xml><?xml version="1.0" encoding="utf-8"?>
+<p:notes xmlns:a="http://schemas.openxmlformats.org/drawingml/2006/main" xmlns:r="http://schemas.openxmlformats.org/officeDocument/2006/relationships" xmlns:p="http://schemas.openxmlformats.org/presentationml/2006/main">
+  <p:cSld>
+    <p:spTree>
+      <p:nvGrpSpPr>
+        <p:cNvPr id="1" name=""/>
+        <p:cNvGrpSpPr/>
+        <p:nvPr/>
+      </p:nvGrpSpPr>
+      <p:grpSpPr>
+        <a:xfrm>
+          <a:off x="0" y="0"/>
+          <a:ext cx="0" cy="0"/>
+          <a:chOff x="0" y="0"/>
+          <a:chExt cx="0" cy="0"/>
+        </a:xfrm>
+      </p:grpSpPr>
+      <p:sp>
+        <p:nvSpPr>
+          <p:cNvPr id="2" name="Slide Image Placeholder 1"/>
+          <p:cNvSpPr>
+            <a:spLocks noGrp="1" noRot="1" noChangeAspect="1"/>
+          </p:cNvSpPr>
+          <p:nvPr>
+            <p:ph type="sldImg"/>
+          </p:nvPr>
+        </p:nvSpPr>
+        <p:spPr/>
+      </p:sp>
+      <p:sp>
+        <p:nvSpPr>
+          <p:cNvPr id="3" name="Notes Placeholder 2"/>
+          <p:cNvSpPr>
+            <a:spLocks noGrp="1"/>
+          </p:cNvSpPr>
+          <p:nvPr>
+            <p:ph type="body" idx="1"/>
+          </p:nvPr>
+        </p:nvSpPr>
+        <p:spPr/>
+        <p:txBody>
+          <a:bodyPr/>
+          <a:lstStyle/>
+          <a:p>
+            <a:r>
+              <a:rPr lang="en-US" dirty="0" smtClean="0"/>
               <a:t>One nice feature about single-file apps is that you can copy and paste the entire app into the R console, which makes it easy to quickly share code for others to experiment with. For example, if you copy and paste the code above into the R command line, it will start a Shiny app.</a:t>
             </a:r>
           </a:p>
@@ -3739,7 +4021,96 @@
               <a:rPr lang="en-US" baseline="0" dirty="0" smtClean="0"/>
               <a:t> of the shiny framework used two files, as it looked for those two files. Now, it looks for the functions, so it can but put in one file or two. </a:t>
             </a:r>
-            <a:endParaRPr lang="en-US" dirty="0"/>
+          </a:p>
+          <a:p>
+            <a:endParaRPr lang="en-US" baseline="0" dirty="0" smtClean="0"/>
+          </a:p>
+          <a:p>
+            <a:r>
+              <a:rPr lang="en-US" baseline="0" dirty="0" smtClean="0"/>
+              <a:t>Notes about the single file application:</a:t>
+            </a:r>
+          </a:p>
+          <a:p>
+            <a:pPr marL="628650" lvl="1" indent="-171450">
+              <a:buFont typeface="Arial"/>
+              <a:buChar char="•"/>
+            </a:pPr>
+            <a:r>
+              <a:rPr lang="en-US" baseline="0" dirty="0" smtClean="0"/>
+              <a:t>Streamlined</a:t>
+            </a:r>
+          </a:p>
+          <a:p>
+            <a:pPr marL="628650" lvl="1" indent="-171450">
+              <a:buFont typeface="Arial"/>
+              <a:buChar char="•"/>
+            </a:pPr>
+            <a:r>
+              <a:rPr lang="en-US" baseline="0" dirty="0" smtClean="0"/>
+              <a:t>Requires a </a:t>
+            </a:r>
+            <a:r>
+              <a:rPr lang="en-US" baseline="0" dirty="0" err="1" smtClean="0"/>
+              <a:t>shinyApp</a:t>
+            </a:r>
+            <a:r>
+              <a:rPr lang="en-US" baseline="0" dirty="0" smtClean="0"/>
+              <a:t>() </a:t>
+            </a:r>
+            <a:r>
+              <a:rPr lang="en-US" baseline="0" dirty="0" err="1" smtClean="0"/>
+              <a:t>funciton</a:t>
+            </a:r>
+            <a:r>
+              <a:rPr lang="en-US" baseline="0" dirty="0" smtClean="0"/>
+              <a:t> to define the UI and Server code blocks that are used.</a:t>
+            </a:r>
+          </a:p>
+          <a:p>
+            <a:pPr marL="628650" lvl="1" indent="-171450">
+              <a:buFont typeface="Arial"/>
+              <a:buChar char="•"/>
+            </a:pPr>
+            <a:endParaRPr lang="en-US" baseline="0" dirty="0" smtClean="0"/>
+          </a:p>
+          <a:p>
+            <a:pPr marL="0" lvl="0" indent="0">
+              <a:buFont typeface="Arial"/>
+              <a:buNone/>
+            </a:pPr>
+            <a:r>
+              <a:rPr lang="en-US" baseline="0" dirty="0" smtClean="0"/>
+              <a:t>Notes about two file application:</a:t>
+            </a:r>
+          </a:p>
+          <a:p>
+            <a:pPr marL="628650" lvl="1" indent="-171450">
+              <a:buFont typeface="Arial"/>
+              <a:buChar char="•"/>
+            </a:pPr>
+            <a:r>
+              <a:rPr lang="en-US" baseline="0" dirty="0" smtClean="0"/>
+              <a:t>Notice, no </a:t>
+            </a:r>
+            <a:r>
+              <a:rPr lang="en-US" baseline="0" dirty="0" err="1" smtClean="0"/>
+              <a:t>shinyApp</a:t>
+            </a:r>
+            <a:r>
+              <a:rPr lang="en-US" baseline="0" dirty="0" smtClean="0"/>
+              <a:t>() function</a:t>
+            </a:r>
+          </a:p>
+          <a:p>
+            <a:pPr marL="628650" lvl="1" indent="-171450">
+              <a:buFont typeface="Arial"/>
+              <a:buChar char="•"/>
+            </a:pPr>
+            <a:r>
+              <a:rPr lang="en-US" baseline="0" dirty="0" smtClean="0"/>
+              <a:t>Both files must reside in the same folder to work</a:t>
+            </a:r>
           </a:p>
         </p:txBody>
       </p:sp>
@@ -3770,6 +4141,374 @@
     <p:extLst>
       <p:ext uri="{BB962C8B-B14F-4D97-AF65-F5344CB8AC3E}">
         <p14:creationId xmlns:p14="http://schemas.microsoft.com/office/powerpoint/2010/main" val="3935190025"/>
+      </p:ext>
+    </p:extLst>
+  </p:cSld>
+  <p:clrMapOvr>
+    <a:masterClrMapping/>
+  </p:clrMapOvr>
+</p:notes>
+</file>
+
+<file path=ppt/notesSlides/notesSlide5.xml><?xml version="1.0" encoding="utf-8"?>
+<p:notes xmlns:a="http://schemas.openxmlformats.org/drawingml/2006/main" xmlns:r="http://schemas.openxmlformats.org/officeDocument/2006/relationships" xmlns:p="http://schemas.openxmlformats.org/presentationml/2006/main">
+  <p:cSld>
+    <p:spTree>
+      <p:nvGrpSpPr>
+        <p:cNvPr id="1" name=""/>
+        <p:cNvGrpSpPr/>
+        <p:nvPr/>
+      </p:nvGrpSpPr>
+      <p:grpSpPr>
+        <a:xfrm>
+          <a:off x="0" y="0"/>
+          <a:ext cx="0" cy="0"/>
+          <a:chOff x="0" y="0"/>
+          <a:chExt cx="0" cy="0"/>
+        </a:xfrm>
+      </p:grpSpPr>
+      <p:sp>
+        <p:nvSpPr>
+          <p:cNvPr id="2" name="Slide Image Placeholder 1"/>
+          <p:cNvSpPr>
+            <a:spLocks noGrp="1" noRot="1" noChangeAspect="1"/>
+          </p:cNvSpPr>
+          <p:nvPr>
+            <p:ph type="sldImg"/>
+          </p:nvPr>
+        </p:nvSpPr>
+        <p:spPr/>
+      </p:sp>
+      <p:sp>
+        <p:nvSpPr>
+          <p:cNvPr id="3" name="Notes Placeholder 2"/>
+          <p:cNvSpPr>
+            <a:spLocks noGrp="1"/>
+          </p:cNvSpPr>
+          <p:nvPr>
+            <p:ph type="body" idx="1"/>
+          </p:nvPr>
+        </p:nvSpPr>
+        <p:spPr/>
+        <p:txBody>
+          <a:bodyPr/>
+          <a:lstStyle/>
+          <a:p>
+            <a:r>
+              <a:rPr lang="en-US" dirty="0" smtClean="0"/>
+              <a:t>As</a:t>
+            </a:r>
+            <a:r>
+              <a:rPr lang="en-US" baseline="0" dirty="0" smtClean="0"/>
+              <a:t> you build you application, think in terms of inputs and outputs. Inputs are things your users can toggle or provide value to the application. Outputs are things your users see – plots, charts, tables, etc.. They respond when your user changes and input. Therefore, when you develop out your application you use Input() functions for inputs and Output() functions for outputs.</a:t>
+            </a:r>
+            <a:endParaRPr lang="en-US" dirty="0"/>
+          </a:p>
+        </p:txBody>
+      </p:sp>
+      <p:sp>
+        <p:nvSpPr>
+          <p:cNvPr id="4" name="Slide Number Placeholder 3"/>
+          <p:cNvSpPr>
+            <a:spLocks noGrp="1"/>
+          </p:cNvSpPr>
+          <p:nvPr>
+            <p:ph type="sldNum" sz="quarter" idx="10"/>
+          </p:nvPr>
+        </p:nvSpPr>
+        <p:spPr/>
+        <p:txBody>
+          <a:bodyPr/>
+          <a:lstStyle/>
+          <a:p>
+            <a:fld id="{8AE7EE44-CD9C-CF4A-9731-BC6225750AAF}" type="slidenum">
+              <a:rPr lang="en-US" smtClean="0"/>
+              <a:t>10</a:t>
+            </a:fld>
+            <a:endParaRPr lang="en-US"/>
+          </a:p>
+        </p:txBody>
+      </p:sp>
+    </p:spTree>
+    <p:extLst>
+      <p:ext uri="{BB962C8B-B14F-4D97-AF65-F5344CB8AC3E}">
+        <p14:creationId xmlns:p14="http://schemas.microsoft.com/office/powerpoint/2010/main" val="2974201331"/>
+      </p:ext>
+    </p:extLst>
+  </p:cSld>
+  <p:clrMapOvr>
+    <a:masterClrMapping/>
+  </p:clrMapOvr>
+</p:notes>
+</file>
+
+<file path=ppt/notesSlides/notesSlide6.xml><?xml version="1.0" encoding="utf-8"?>
+<p:notes xmlns:a="http://schemas.openxmlformats.org/drawingml/2006/main" xmlns:r="http://schemas.openxmlformats.org/officeDocument/2006/relationships" xmlns:p="http://schemas.openxmlformats.org/presentationml/2006/main">
+  <p:cSld>
+    <p:spTree>
+      <p:nvGrpSpPr>
+        <p:cNvPr id="1" name=""/>
+        <p:cNvGrpSpPr/>
+        <p:nvPr/>
+      </p:nvGrpSpPr>
+      <p:grpSpPr>
+        <a:xfrm>
+          <a:off x="0" y="0"/>
+          <a:ext cx="0" cy="0"/>
+          <a:chOff x="0" y="0"/>
+          <a:chExt cx="0" cy="0"/>
+        </a:xfrm>
+      </p:grpSpPr>
+      <p:sp>
+        <p:nvSpPr>
+          <p:cNvPr id="2" name="Slide Image Placeholder 1"/>
+          <p:cNvSpPr>
+            <a:spLocks noGrp="1" noRot="1" noChangeAspect="1"/>
+          </p:cNvSpPr>
+          <p:nvPr>
+            <p:ph type="sldImg"/>
+          </p:nvPr>
+        </p:nvSpPr>
+        <p:spPr/>
+      </p:sp>
+      <p:sp>
+        <p:nvSpPr>
+          <p:cNvPr id="3" name="Notes Placeholder 2"/>
+          <p:cNvSpPr>
+            <a:spLocks noGrp="1"/>
+          </p:cNvSpPr>
+          <p:nvPr>
+            <p:ph type="body" idx="1"/>
+          </p:nvPr>
+        </p:nvSpPr>
+        <p:spPr/>
+        <p:txBody>
+          <a:bodyPr/>
+          <a:lstStyle/>
+          <a:p>
+            <a:r>
+              <a:rPr lang="en-US" dirty="0" smtClean="0"/>
+              <a:t>As</a:t>
+            </a:r>
+            <a:r>
+              <a:rPr lang="en-US" baseline="0" dirty="0" smtClean="0"/>
+              <a:t> you build you application, think in terms of inputs and outputs. Inputs are things your users can toggle or provide value to the application. Outputs are things your users see – plots, charts, tables, etc.. They respond when your user changes and input. Therefore, when you develop out your application you use Input() functions for inputs and Output() functions </a:t>
+            </a:r>
+            <a:r>
+              <a:rPr lang="en-US" baseline="0" smtClean="0"/>
+              <a:t>for outputs.</a:t>
+            </a:r>
+            <a:endParaRPr lang="en-US" dirty="0"/>
+          </a:p>
+        </p:txBody>
+      </p:sp>
+      <p:sp>
+        <p:nvSpPr>
+          <p:cNvPr id="4" name="Slide Number Placeholder 3"/>
+          <p:cNvSpPr>
+            <a:spLocks noGrp="1"/>
+          </p:cNvSpPr>
+          <p:nvPr>
+            <p:ph type="sldNum" sz="quarter" idx="10"/>
+          </p:nvPr>
+        </p:nvSpPr>
+        <p:spPr/>
+        <p:txBody>
+          <a:bodyPr/>
+          <a:lstStyle/>
+          <a:p>
+            <a:fld id="{8AE7EE44-CD9C-CF4A-9731-BC6225750AAF}" type="slidenum">
+              <a:rPr lang="en-US" smtClean="0"/>
+              <a:t>11</a:t>
+            </a:fld>
+            <a:endParaRPr lang="en-US"/>
+          </a:p>
+        </p:txBody>
+      </p:sp>
+    </p:spTree>
+    <p:extLst>
+      <p:ext uri="{BB962C8B-B14F-4D97-AF65-F5344CB8AC3E}">
+        <p14:creationId xmlns:p14="http://schemas.microsoft.com/office/powerpoint/2010/main" val="2974201331"/>
+      </p:ext>
+    </p:extLst>
+  </p:cSld>
+  <p:clrMapOvr>
+    <a:masterClrMapping/>
+  </p:clrMapOvr>
+</p:notes>
+</file>
+
+<file path=ppt/notesSlides/notesSlide7.xml><?xml version="1.0" encoding="utf-8"?>
+<p:notes xmlns:a="http://schemas.openxmlformats.org/drawingml/2006/main" xmlns:r="http://schemas.openxmlformats.org/officeDocument/2006/relationships" xmlns:p="http://schemas.openxmlformats.org/presentationml/2006/main">
+  <p:cSld>
+    <p:spTree>
+      <p:nvGrpSpPr>
+        <p:cNvPr id="1" name=""/>
+        <p:cNvGrpSpPr/>
+        <p:nvPr/>
+      </p:nvGrpSpPr>
+      <p:grpSpPr>
+        <a:xfrm>
+          <a:off x="0" y="0"/>
+          <a:ext cx="0" cy="0"/>
+          <a:chOff x="0" y="0"/>
+          <a:chExt cx="0" cy="0"/>
+        </a:xfrm>
+      </p:grpSpPr>
+      <p:sp>
+        <p:nvSpPr>
+          <p:cNvPr id="2" name="Slide Image Placeholder 1"/>
+          <p:cNvSpPr>
+            <a:spLocks noGrp="1" noRot="1" noChangeAspect="1"/>
+          </p:cNvSpPr>
+          <p:nvPr>
+            <p:ph type="sldImg"/>
+          </p:nvPr>
+        </p:nvSpPr>
+        <p:spPr/>
+      </p:sp>
+      <p:sp>
+        <p:nvSpPr>
+          <p:cNvPr id="3" name="Notes Placeholder 2"/>
+          <p:cNvSpPr>
+            <a:spLocks noGrp="1"/>
+          </p:cNvSpPr>
+          <p:nvPr>
+            <p:ph type="body" idx="1"/>
+          </p:nvPr>
+        </p:nvSpPr>
+        <p:spPr/>
+        <p:txBody>
+          <a:bodyPr/>
+          <a:lstStyle/>
+          <a:p>
+            <a:r>
+              <a:rPr lang="en-US" dirty="0" smtClean="0"/>
+              <a:t>As</a:t>
+            </a:r>
+            <a:r>
+              <a:rPr lang="en-US" baseline="0" dirty="0" smtClean="0"/>
+              <a:t> you build you application, think in terms of inputs and outputs. Inputs are things your users can toggle or provide value to the application. Outputs are things your users see – plots, charts, tables, etc.. They respond when your user changes and input. Therefore, when you develop out your application you use Input() functions for inputs and Output() functions </a:t>
+            </a:r>
+            <a:r>
+              <a:rPr lang="en-US" baseline="0" smtClean="0"/>
+              <a:t>for outputs.</a:t>
+            </a:r>
+            <a:endParaRPr lang="en-US" dirty="0"/>
+          </a:p>
+        </p:txBody>
+      </p:sp>
+      <p:sp>
+        <p:nvSpPr>
+          <p:cNvPr id="4" name="Slide Number Placeholder 3"/>
+          <p:cNvSpPr>
+            <a:spLocks noGrp="1"/>
+          </p:cNvSpPr>
+          <p:nvPr>
+            <p:ph type="sldNum" sz="quarter" idx="10"/>
+          </p:nvPr>
+        </p:nvSpPr>
+        <p:spPr/>
+        <p:txBody>
+          <a:bodyPr/>
+          <a:lstStyle/>
+          <a:p>
+            <a:fld id="{8AE7EE44-CD9C-CF4A-9731-BC6225750AAF}" type="slidenum">
+              <a:rPr lang="en-US" smtClean="0"/>
+              <a:t>12</a:t>
+            </a:fld>
+            <a:endParaRPr lang="en-US"/>
+          </a:p>
+        </p:txBody>
+      </p:sp>
+    </p:spTree>
+    <p:extLst>
+      <p:ext uri="{BB962C8B-B14F-4D97-AF65-F5344CB8AC3E}">
+        <p14:creationId xmlns:p14="http://schemas.microsoft.com/office/powerpoint/2010/main" val="2974201331"/>
+      </p:ext>
+    </p:extLst>
+  </p:cSld>
+  <p:clrMapOvr>
+    <a:masterClrMapping/>
+  </p:clrMapOvr>
+</p:notes>
+</file>
+
+<file path=ppt/notesSlides/notesSlide8.xml><?xml version="1.0" encoding="utf-8"?>
+<p:notes xmlns:a="http://schemas.openxmlformats.org/drawingml/2006/main" xmlns:r="http://schemas.openxmlformats.org/officeDocument/2006/relationships" xmlns:p="http://schemas.openxmlformats.org/presentationml/2006/main">
+  <p:cSld>
+    <p:spTree>
+      <p:nvGrpSpPr>
+        <p:cNvPr id="1" name=""/>
+        <p:cNvGrpSpPr/>
+        <p:nvPr/>
+      </p:nvGrpSpPr>
+      <p:grpSpPr>
+        <a:xfrm>
+          <a:off x="0" y="0"/>
+          <a:ext cx="0" cy="0"/>
+          <a:chOff x="0" y="0"/>
+          <a:chExt cx="0" cy="0"/>
+        </a:xfrm>
+      </p:grpSpPr>
+      <p:sp>
+        <p:nvSpPr>
+          <p:cNvPr id="2" name="Slide Image Placeholder 1"/>
+          <p:cNvSpPr>
+            <a:spLocks noGrp="1" noRot="1" noChangeAspect="1"/>
+          </p:cNvSpPr>
+          <p:nvPr>
+            <p:ph type="sldImg"/>
+          </p:nvPr>
+        </p:nvSpPr>
+        <p:spPr/>
+      </p:sp>
+      <p:sp>
+        <p:nvSpPr>
+          <p:cNvPr id="3" name="Notes Placeholder 2"/>
+          <p:cNvSpPr>
+            <a:spLocks noGrp="1"/>
+          </p:cNvSpPr>
+          <p:nvPr>
+            <p:ph type="body" idx="1"/>
+          </p:nvPr>
+        </p:nvSpPr>
+        <p:spPr/>
+        <p:txBody>
+          <a:bodyPr/>
+          <a:lstStyle/>
+          <a:p>
+            <a:endParaRPr lang="en-US" dirty="0"/>
+          </a:p>
+        </p:txBody>
+      </p:sp>
+      <p:sp>
+        <p:nvSpPr>
+          <p:cNvPr id="4" name="Slide Number Placeholder 3"/>
+          <p:cNvSpPr>
+            <a:spLocks noGrp="1"/>
+          </p:cNvSpPr>
+          <p:nvPr>
+            <p:ph type="sldNum" sz="quarter" idx="10"/>
+          </p:nvPr>
+        </p:nvSpPr>
+        <p:spPr/>
+        <p:txBody>
+          <a:bodyPr/>
+          <a:lstStyle/>
+          <a:p>
+            <a:fld id="{8AE7EE44-CD9C-CF4A-9731-BC6225750AAF}" type="slidenum">
+              <a:rPr lang="en-US" smtClean="0"/>
+              <a:t>13</a:t>
+            </a:fld>
+            <a:endParaRPr lang="en-US"/>
+          </a:p>
+        </p:txBody>
+      </p:sp>
+    </p:spTree>
+    <p:extLst>
+      <p:ext uri="{BB962C8B-B14F-4D97-AF65-F5344CB8AC3E}">
+        <p14:creationId xmlns:p14="http://schemas.microsoft.com/office/powerpoint/2010/main" val="2974201331"/>
       </p:ext>
     </p:extLst>
   </p:cSld>
@@ -6918,7 +7657,7 @@
           <a:p>
             <a:r>
               <a:rPr lang="en-US" dirty="0" smtClean="0"/>
-              <a:t>Hands On Example</a:t>
+              <a:t>Inputs &amp; Outputs</a:t>
             </a:r>
             <a:endParaRPr lang="en-US" dirty="0"/>
           </a:p>
@@ -6936,12 +7675,12 @@
         </p:nvSpPr>
         <p:spPr>
           <a:xfrm>
-            <a:off x="457200" y="0"/>
-            <a:ext cx="8229600" cy="6858000"/>
+            <a:off x="275673" y="1653894"/>
+            <a:ext cx="8614805" cy="4223337"/>
           </a:xfrm>
         </p:spPr>
         <p:txBody>
-          <a:bodyPr anchor="ctr"/>
+          <a:bodyPr anchor="t"/>
           <a:lstStyle/>
           <a:p>
             <a:pPr marL="0" indent="0" algn="ctr">
@@ -6949,16 +7688,37 @@
             </a:pPr>
             <a:r>
               <a:rPr lang="en-US" dirty="0" smtClean="0"/>
-              <a:t>Create Application in </a:t>
-            </a:r>
-            <a:r>
-              <a:rPr lang="en-US" dirty="0" err="1" smtClean="0"/>
-              <a:t>RStudio</a:t>
-            </a:r>
+              <a:t>As you develop your applications think in terms of:</a:t>
+            </a:r>
+          </a:p>
+          <a:p>
+            <a:pPr marL="0" indent="0" algn="ctr">
+              <a:buNone/>
+            </a:pPr>
+            <a:endParaRPr lang="en-US" dirty="0"/>
+          </a:p>
+          <a:p>
             <a:r>
               <a:rPr lang="en-US" dirty="0" smtClean="0"/>
-              <a:t> and Execute It</a:t>
-            </a:r>
+              <a:t>Inputs and Outputs</a:t>
+            </a:r>
+          </a:p>
+          <a:p>
+            <a:pPr lvl="1"/>
+            <a:r>
+              <a:rPr lang="en-US" dirty="0" smtClean="0"/>
+              <a:t>Inputs: Things your users can toggle.</a:t>
+            </a:r>
+          </a:p>
+          <a:p>
+            <a:pPr lvl="1"/>
+            <a:r>
+              <a:rPr lang="en-US" dirty="0" smtClean="0"/>
+              <a:t>Outputs: Things your users see.</a:t>
+            </a:r>
+          </a:p>
+          <a:p>
+            <a:pPr lvl="1"/>
             <a:endParaRPr lang="en-US" dirty="0"/>
           </a:p>
         </p:txBody>
@@ -6966,7 +7726,7 @@
     </p:spTree>
     <p:extLst>
       <p:ext uri="{BB962C8B-B14F-4D97-AF65-F5344CB8AC3E}">
-        <p14:creationId xmlns:p14="http://schemas.microsoft.com/office/powerpoint/2010/main" val="2888810442"/>
+        <p14:creationId xmlns:p14="http://schemas.microsoft.com/office/powerpoint/2010/main" val="1050609639"/>
       </p:ext>
     </p:extLst>
   </p:cSld>
@@ -7003,6 +7763,405 @@
             <p:ph type="title"/>
           </p:nvPr>
         </p:nvSpPr>
+        <p:spPr>
+          <a:xfrm>
+            <a:off x="457200" y="96060"/>
+            <a:ext cx="8229600" cy="1143000"/>
+          </a:xfrm>
+        </p:spPr>
+        <p:txBody>
+          <a:bodyPr/>
+          <a:lstStyle/>
+          <a:p>
+            <a:r>
+              <a:rPr lang="en-US" dirty="0" smtClean="0"/>
+              <a:t>Inputs</a:t>
+            </a:r>
+            <a:endParaRPr lang="en-US" dirty="0"/>
+          </a:p>
+        </p:txBody>
+      </p:sp>
+      <p:pic>
+        <p:nvPicPr>
+          <p:cNvPr id="5" name="Picture 4" descr="Screen Shot 2017-05-20 at 2.38.37 PM.png"/>
+          <p:cNvPicPr>
+            <a:picLocks noChangeAspect="1"/>
+          </p:cNvPicPr>
+          <p:nvPr/>
+        </p:nvPicPr>
+        <p:blipFill>
+          <a:blip r:embed="rId3">
+            <a:extLst>
+              <a:ext uri="{28A0092B-C50C-407E-A947-70E740481C1C}">
+                <a14:useLocalDpi xmlns:a14="http://schemas.microsoft.com/office/drawing/2010/main" val="0"/>
+              </a:ext>
+            </a:extLst>
+          </a:blip>
+          <a:stretch>
+            <a:fillRect/>
+          </a:stretch>
+        </p:blipFill>
+        <p:spPr>
+          <a:xfrm>
+            <a:off x="108304" y="1669706"/>
+            <a:ext cx="8956936" cy="3212992"/>
+          </a:xfrm>
+          <a:prstGeom prst="rect">
+            <a:avLst/>
+          </a:prstGeom>
+        </p:spPr>
+      </p:pic>
+    </p:spTree>
+    <p:extLst>
+      <p:ext uri="{BB962C8B-B14F-4D97-AF65-F5344CB8AC3E}">
+        <p14:creationId xmlns:p14="http://schemas.microsoft.com/office/powerpoint/2010/main" val="3158641809"/>
+      </p:ext>
+    </p:extLst>
+  </p:cSld>
+  <p:clrMapOvr>
+    <a:masterClrMapping/>
+  </p:clrMapOvr>
+</p:sld>
+</file>
+
+<file path=ppt/slides/slide12.xml><?xml version="1.0" encoding="utf-8"?>
+<p:sld xmlns:a="http://schemas.openxmlformats.org/drawingml/2006/main" xmlns:r="http://schemas.openxmlformats.org/officeDocument/2006/relationships" xmlns:p="http://schemas.openxmlformats.org/presentationml/2006/main">
+  <p:cSld>
+    <p:spTree>
+      <p:nvGrpSpPr>
+        <p:cNvPr id="1" name=""/>
+        <p:cNvGrpSpPr/>
+        <p:nvPr/>
+      </p:nvGrpSpPr>
+      <p:grpSpPr>
+        <a:xfrm>
+          <a:off x="0" y="0"/>
+          <a:ext cx="0" cy="0"/>
+          <a:chOff x="0" y="0"/>
+          <a:chExt cx="0" cy="0"/>
+        </a:xfrm>
+      </p:grpSpPr>
+      <p:sp>
+        <p:nvSpPr>
+          <p:cNvPr id="2" name="Title 1"/>
+          <p:cNvSpPr>
+            <a:spLocks noGrp="1"/>
+          </p:cNvSpPr>
+          <p:nvPr>
+            <p:ph type="title"/>
+          </p:nvPr>
+        </p:nvSpPr>
+        <p:spPr>
+          <a:xfrm>
+            <a:off x="457200" y="96060"/>
+            <a:ext cx="8229600" cy="1143000"/>
+          </a:xfrm>
+        </p:spPr>
+        <p:txBody>
+          <a:bodyPr/>
+          <a:lstStyle/>
+          <a:p>
+            <a:r>
+              <a:rPr lang="en-US" dirty="0" smtClean="0"/>
+              <a:t>Outputs</a:t>
+            </a:r>
+            <a:endParaRPr lang="en-US" dirty="0"/>
+          </a:p>
+        </p:txBody>
+      </p:sp>
+      <p:pic>
+        <p:nvPicPr>
+          <p:cNvPr id="3" name="Picture 2" descr="Screen Shot 2017-05-20 at 2.42.57 PM.png"/>
+          <p:cNvPicPr>
+            <a:picLocks noChangeAspect="1"/>
+          </p:cNvPicPr>
+          <p:nvPr/>
+        </p:nvPicPr>
+        <p:blipFill>
+          <a:blip r:embed="rId3">
+            <a:extLst>
+              <a:ext uri="{28A0092B-C50C-407E-A947-70E740481C1C}">
+                <a14:useLocalDpi xmlns:a14="http://schemas.microsoft.com/office/drawing/2010/main" val="0"/>
+              </a:ext>
+            </a:extLst>
+          </a:blip>
+          <a:stretch>
+            <a:fillRect/>
+          </a:stretch>
+        </p:blipFill>
+        <p:spPr>
+          <a:xfrm>
+            <a:off x="308987" y="1399427"/>
+            <a:ext cx="2979630" cy="2597484"/>
+          </a:xfrm>
+          <a:prstGeom prst="rect">
+            <a:avLst/>
+          </a:prstGeom>
+        </p:spPr>
+      </p:pic>
+      <p:pic>
+        <p:nvPicPr>
+          <p:cNvPr id="4" name="Picture 3" descr="Screen Shot 2017-05-20 at 2.44.41 PM.png"/>
+          <p:cNvPicPr>
+            <a:picLocks noChangeAspect="1"/>
+          </p:cNvPicPr>
+          <p:nvPr/>
+        </p:nvPicPr>
+        <p:blipFill>
+          <a:blip r:embed="rId4">
+            <a:extLst>
+              <a:ext uri="{28A0092B-C50C-407E-A947-70E740481C1C}">
+                <a14:useLocalDpi xmlns:a14="http://schemas.microsoft.com/office/drawing/2010/main" val="0"/>
+              </a:ext>
+            </a:extLst>
+          </a:blip>
+          <a:stretch>
+            <a:fillRect/>
+          </a:stretch>
+        </p:blipFill>
+        <p:spPr>
+          <a:xfrm>
+            <a:off x="308987" y="4130945"/>
+            <a:ext cx="5677329" cy="2524009"/>
+          </a:xfrm>
+          <a:prstGeom prst="rect">
+            <a:avLst/>
+          </a:prstGeom>
+        </p:spPr>
+      </p:pic>
+      <p:pic>
+        <p:nvPicPr>
+          <p:cNvPr id="7" name="Picture 6" descr="Screen Shot 2017-05-20 at 2.47.19 PM.png"/>
+          <p:cNvPicPr>
+            <a:picLocks noChangeAspect="1"/>
+          </p:cNvPicPr>
+          <p:nvPr/>
+        </p:nvPicPr>
+        <p:blipFill>
+          <a:blip r:embed="rId5">
+            <a:extLst>
+              <a:ext uri="{28A0092B-C50C-407E-A947-70E740481C1C}">
+                <a14:useLocalDpi xmlns:a14="http://schemas.microsoft.com/office/drawing/2010/main" val="0"/>
+              </a:ext>
+            </a:extLst>
+          </a:blip>
+          <a:stretch>
+            <a:fillRect/>
+          </a:stretch>
+        </p:blipFill>
+        <p:spPr>
+          <a:xfrm>
+            <a:off x="4334479" y="1399427"/>
+            <a:ext cx="4720911" cy="2377236"/>
+          </a:xfrm>
+          <a:prstGeom prst="rect">
+            <a:avLst/>
+          </a:prstGeom>
+        </p:spPr>
+      </p:pic>
+      <p:pic>
+        <p:nvPicPr>
+          <p:cNvPr id="8" name="Picture 7" descr="Screen Shot 2017-05-20 at 3.07.27 PM.png"/>
+          <p:cNvPicPr>
+            <a:picLocks noChangeAspect="1"/>
+          </p:cNvPicPr>
+          <p:nvPr/>
+        </p:nvPicPr>
+        <p:blipFill>
+          <a:blip r:embed="rId6">
+            <a:extLst>
+              <a:ext uri="{28A0092B-C50C-407E-A947-70E740481C1C}">
+                <a14:useLocalDpi xmlns:a14="http://schemas.microsoft.com/office/drawing/2010/main" val="0"/>
+              </a:ext>
+            </a:extLst>
+          </a:blip>
+          <a:stretch>
+            <a:fillRect/>
+          </a:stretch>
+        </p:blipFill>
+        <p:spPr>
+          <a:xfrm>
+            <a:off x="2137617" y="2519286"/>
+            <a:ext cx="1909568" cy="1257377"/>
+          </a:xfrm>
+          <a:prstGeom prst="rect">
+            <a:avLst/>
+          </a:prstGeom>
+        </p:spPr>
+      </p:pic>
+      <p:pic>
+        <p:nvPicPr>
+          <p:cNvPr id="9" name="Picture 8" descr="Screen Shot 2017-05-20 at 3.07.40 PM.png"/>
+          <p:cNvPicPr>
+            <a:picLocks noChangeAspect="1"/>
+          </p:cNvPicPr>
+          <p:nvPr/>
+        </p:nvPicPr>
+        <p:blipFill>
+          <a:blip r:embed="rId7">
+            <a:extLst>
+              <a:ext uri="{28A0092B-C50C-407E-A947-70E740481C1C}">
+                <a14:useLocalDpi xmlns:a14="http://schemas.microsoft.com/office/drawing/2010/main" val="0"/>
+              </a:ext>
+            </a:extLst>
+          </a:blip>
+          <a:stretch>
+            <a:fillRect/>
+          </a:stretch>
+        </p:blipFill>
+        <p:spPr>
+          <a:xfrm>
+            <a:off x="6365173" y="4396760"/>
+            <a:ext cx="2332538" cy="2061313"/>
+          </a:xfrm>
+          <a:prstGeom prst="rect">
+            <a:avLst/>
+          </a:prstGeom>
+        </p:spPr>
+      </p:pic>
+    </p:spTree>
+    <p:extLst>
+      <p:ext uri="{BB962C8B-B14F-4D97-AF65-F5344CB8AC3E}">
+        <p14:creationId xmlns:p14="http://schemas.microsoft.com/office/powerpoint/2010/main" val="3629243679"/>
+      </p:ext>
+    </p:extLst>
+  </p:cSld>
+  <p:clrMapOvr>
+    <a:masterClrMapping/>
+  </p:clrMapOvr>
+</p:sld>
+</file>
+
+<file path=ppt/slides/slide13.xml><?xml version="1.0" encoding="utf-8"?>
+<p:sld xmlns:a="http://schemas.openxmlformats.org/drawingml/2006/main" xmlns:r="http://schemas.openxmlformats.org/officeDocument/2006/relationships" xmlns:p="http://schemas.openxmlformats.org/presentationml/2006/main">
+  <p:cSld>
+    <p:spTree>
+      <p:nvGrpSpPr>
+        <p:cNvPr id="1" name=""/>
+        <p:cNvGrpSpPr/>
+        <p:nvPr/>
+      </p:nvGrpSpPr>
+      <p:grpSpPr>
+        <a:xfrm>
+          <a:off x="0" y="0"/>
+          <a:ext cx="0" cy="0"/>
+          <a:chOff x="0" y="0"/>
+          <a:chExt cx="0" cy="0"/>
+        </a:xfrm>
+      </p:grpSpPr>
+      <p:sp>
+        <p:nvSpPr>
+          <p:cNvPr id="2" name="Title 1"/>
+          <p:cNvSpPr>
+            <a:spLocks noGrp="1"/>
+          </p:cNvSpPr>
+          <p:nvPr>
+            <p:ph type="title"/>
+          </p:nvPr>
+        </p:nvSpPr>
+        <p:spPr>
+          <a:xfrm>
+            <a:off x="457200" y="96060"/>
+            <a:ext cx="8229600" cy="1143000"/>
+          </a:xfrm>
+        </p:spPr>
+        <p:txBody>
+          <a:bodyPr/>
+          <a:lstStyle/>
+          <a:p>
+            <a:r>
+              <a:rPr lang="en-US" dirty="0" smtClean="0"/>
+              <a:t>Hands On Example</a:t>
+            </a:r>
+            <a:endParaRPr lang="en-US" dirty="0"/>
+          </a:p>
+        </p:txBody>
+      </p:sp>
+      <p:sp>
+        <p:nvSpPr>
+          <p:cNvPr id="3" name="Content Placeholder 2"/>
+          <p:cNvSpPr>
+            <a:spLocks noGrp="1"/>
+          </p:cNvSpPr>
+          <p:nvPr>
+            <p:ph idx="1"/>
+          </p:nvPr>
+        </p:nvSpPr>
+        <p:spPr>
+          <a:xfrm>
+            <a:off x="457200" y="0"/>
+            <a:ext cx="8229600" cy="6858000"/>
+          </a:xfrm>
+        </p:spPr>
+        <p:txBody>
+          <a:bodyPr anchor="ctr"/>
+          <a:lstStyle/>
+          <a:p>
+            <a:pPr marL="0" indent="0" algn="ctr">
+              <a:buNone/>
+            </a:pPr>
+            <a:r>
+              <a:rPr lang="en-US" dirty="0" smtClean="0"/>
+              <a:t>Create Basic Application</a:t>
+            </a:r>
+          </a:p>
+          <a:p>
+            <a:pPr marL="0" indent="0" algn="ctr">
+              <a:buNone/>
+            </a:pPr>
+            <a:endParaRPr lang="en-US" dirty="0"/>
+          </a:p>
+          <a:p>
+            <a:pPr marL="0" indent="0" algn="ctr">
+              <a:buNone/>
+            </a:pPr>
+            <a:r>
+              <a:rPr lang="en-US" dirty="0" smtClean="0"/>
+              <a:t>Example 1</a:t>
+            </a:r>
+          </a:p>
+        </p:txBody>
+      </p:sp>
+    </p:spTree>
+    <p:extLst>
+      <p:ext uri="{BB962C8B-B14F-4D97-AF65-F5344CB8AC3E}">
+        <p14:creationId xmlns:p14="http://schemas.microsoft.com/office/powerpoint/2010/main" val="2888810442"/>
+      </p:ext>
+    </p:extLst>
+  </p:cSld>
+  <p:clrMapOvr>
+    <a:masterClrMapping/>
+  </p:clrMapOvr>
+</p:sld>
+</file>
+
+<file path=ppt/slides/slide14.xml><?xml version="1.0" encoding="utf-8"?>
+<p:sld xmlns:a="http://schemas.openxmlformats.org/drawingml/2006/main" xmlns:r="http://schemas.openxmlformats.org/officeDocument/2006/relationships" xmlns:p="http://schemas.openxmlformats.org/presentationml/2006/main">
+  <p:cSld>
+    <p:spTree>
+      <p:nvGrpSpPr>
+        <p:cNvPr id="1" name=""/>
+        <p:cNvGrpSpPr/>
+        <p:nvPr/>
+      </p:nvGrpSpPr>
+      <p:grpSpPr>
+        <a:xfrm>
+          <a:off x="0" y="0"/>
+          <a:ext cx="0" cy="0"/>
+          <a:chOff x="0" y="0"/>
+          <a:chExt cx="0" cy="0"/>
+        </a:xfrm>
+      </p:grpSpPr>
+      <p:sp>
+        <p:nvSpPr>
+          <p:cNvPr id="2" name="Title 1"/>
+          <p:cNvSpPr>
+            <a:spLocks noGrp="1"/>
+          </p:cNvSpPr>
+          <p:nvPr>
+            <p:ph type="title"/>
+          </p:nvPr>
+        </p:nvSpPr>
         <p:spPr/>
         <p:txBody>
           <a:bodyPr/>
@@ -7053,10 +8212,9 @@
           <a:p>
             <a:pPr marL="400050"/>
             <a:r>
-              <a:rPr lang="en-US" sz="2000" smtClean="0"/>
+              <a:rPr lang="en-US" sz="2000" dirty="0" smtClean="0"/>
               <a:t>Tutorials (Web and Video)</a:t>
             </a:r>
-            <a:endParaRPr lang="en-US" sz="2000" dirty="0" smtClean="0"/>
           </a:p>
           <a:p>
             <a:pPr marL="514350" lvl="1" indent="0">
@@ -7114,6 +8272,37 @@
           </a:p>
           <a:p>
             <a:pPr marL="571500" lvl="1" indent="0">
+              <a:buNone/>
+            </a:pPr>
+            <a:endParaRPr lang="en-US" sz="1600" dirty="0"/>
+          </a:p>
+          <a:p>
+            <a:pPr marL="571500" lvl="1" indent="0">
+              <a:buNone/>
+            </a:pPr>
+            <a:endParaRPr lang="en-US" sz="1600" dirty="0" smtClean="0"/>
+          </a:p>
+          <a:p>
+            <a:pPr marL="514350"/>
+            <a:r>
+              <a:rPr lang="en-US" sz="2000" dirty="0" smtClean="0"/>
+              <a:t>This Presentation &amp; All Code</a:t>
+            </a:r>
+          </a:p>
+          <a:p>
+            <a:pPr marL="628650" lvl="1" indent="0">
+              <a:buNone/>
+            </a:pPr>
+            <a:r>
+              <a:rPr lang="en-US" sz="1600" dirty="0" smtClean="0">
+                <a:hlinkClick r:id="rId6"/>
+              </a:rPr>
+              <a:t>https://github.com/cabradbury/shiny-apps-part1</a:t>
+            </a:r>
+            <a:endParaRPr lang="en-US" sz="1600" dirty="0" smtClean="0"/>
+          </a:p>
+          <a:p>
+            <a:pPr marL="628650" lvl="1" indent="0">
               <a:buNone/>
             </a:pPr>
             <a:endParaRPr lang="en-US" sz="1600" dirty="0" smtClean="0"/>
@@ -7392,7 +8581,7 @@
           <a:p>
             <a:r>
               <a:rPr lang="en-US" dirty="0" smtClean="0"/>
-              <a:t>Deployment/Hosting Options</a:t>
+              <a:t>Deployment/Hosting Options (Local / Web)</a:t>
             </a:r>
           </a:p>
           <a:p>
@@ -8077,7 +9266,7 @@
           <a:p>
             <a:r>
               <a:rPr lang="en-US" dirty="0" smtClean="0"/>
-              <a:t>Environments (</a:t>
+              <a:t>Environments / Scoping (</a:t>
             </a:r>
             <a:r>
               <a:rPr lang="en-US" dirty="0" err="1" smtClean="0"/>

</xml_diff>

<commit_message>
Update presentation and code comments.
</commit_message>
<xml_diff>
--- a/Presentation.pptx
+++ b/Presentation.pptx
@@ -5,7 +5,7 @@
     <p:sldMasterId id="2147483648" r:id="rId1"/>
   </p:sldMasterIdLst>
   <p:notesMasterIdLst>
-    <p:notesMasterId r:id="rId23"/>
+    <p:notesMasterId r:id="rId24"/>
   </p:notesMasterIdLst>
   <p:sldIdLst>
     <p:sldId id="256" r:id="rId2"/>
@@ -28,7 +28,8 @@
     <p:sldId id="276" r:id="rId19"/>
     <p:sldId id="277" r:id="rId20"/>
     <p:sldId id="278" r:id="rId21"/>
-    <p:sldId id="267" r:id="rId22"/>
+    <p:sldId id="279" r:id="rId22"/>
+    <p:sldId id="267" r:id="rId23"/>
   </p:sldIdLst>
   <p:sldSz cx="9144000" cy="6858000" type="screen4x3"/>
   <p:notesSz cx="6858000" cy="9144000"/>
@@ -4396,6 +4397,93 @@
 </p:notes>
 </file>
 
+<file path=ppt/notesSlides/notesSlide16.xml><?xml version="1.0" encoding="utf-8"?>
+<p:notes xmlns:a="http://schemas.openxmlformats.org/drawingml/2006/main" xmlns:r="http://schemas.openxmlformats.org/officeDocument/2006/relationships" xmlns:p="http://schemas.openxmlformats.org/presentationml/2006/main">
+  <p:cSld>
+    <p:spTree>
+      <p:nvGrpSpPr>
+        <p:cNvPr id="1" name=""/>
+        <p:cNvGrpSpPr/>
+        <p:nvPr/>
+      </p:nvGrpSpPr>
+      <p:grpSpPr>
+        <a:xfrm>
+          <a:off x="0" y="0"/>
+          <a:ext cx="0" cy="0"/>
+          <a:chOff x="0" y="0"/>
+          <a:chExt cx="0" cy="0"/>
+        </a:xfrm>
+      </p:grpSpPr>
+      <p:sp>
+        <p:nvSpPr>
+          <p:cNvPr id="2" name="Slide Image Placeholder 1"/>
+          <p:cNvSpPr>
+            <a:spLocks noGrp="1" noRot="1" noChangeAspect="1"/>
+          </p:cNvSpPr>
+          <p:nvPr>
+            <p:ph type="sldImg"/>
+          </p:nvPr>
+        </p:nvSpPr>
+        <p:spPr/>
+      </p:sp>
+      <p:sp>
+        <p:nvSpPr>
+          <p:cNvPr id="3" name="Notes Placeholder 2"/>
+          <p:cNvSpPr>
+            <a:spLocks noGrp="1"/>
+          </p:cNvSpPr>
+          <p:nvPr>
+            <p:ph type="body" idx="1"/>
+          </p:nvPr>
+        </p:nvSpPr>
+        <p:spPr/>
+        <p:txBody>
+          <a:bodyPr/>
+          <a:lstStyle/>
+          <a:p>
+            <a:endParaRPr lang="en-US" dirty="0" smtClean="0"/>
+          </a:p>
+          <a:p>
+            <a:endParaRPr lang="en-US" dirty="0"/>
+          </a:p>
+        </p:txBody>
+      </p:sp>
+      <p:sp>
+        <p:nvSpPr>
+          <p:cNvPr id="4" name="Slide Number Placeholder 3"/>
+          <p:cNvSpPr>
+            <a:spLocks noGrp="1"/>
+          </p:cNvSpPr>
+          <p:nvPr>
+            <p:ph type="sldNum" sz="quarter" idx="10"/>
+          </p:nvPr>
+        </p:nvSpPr>
+        <p:spPr/>
+        <p:txBody>
+          <a:bodyPr/>
+          <a:lstStyle/>
+          <a:p>
+            <a:fld id="{8AE7EE44-CD9C-CF4A-9731-BC6225750AAF}" type="slidenum">
+              <a:rPr lang="en-US" smtClean="0"/>
+              <a:t>21</a:t>
+            </a:fld>
+            <a:endParaRPr lang="en-US"/>
+          </a:p>
+        </p:txBody>
+      </p:sp>
+    </p:spTree>
+    <p:extLst>
+      <p:ext uri="{BB962C8B-B14F-4D97-AF65-F5344CB8AC3E}">
+        <p14:creationId xmlns:p14="http://schemas.microsoft.com/office/powerpoint/2010/main" val="1777757002"/>
+      </p:ext>
+    </p:extLst>
+  </p:cSld>
+  <p:clrMapOvr>
+    <a:masterClrMapping/>
+  </p:clrMapOvr>
+</p:notes>
+</file>
+
 <file path=ppt/notesSlides/notesSlide2.xml><?xml version="1.0" encoding="utf-8"?>
 <p:notes xmlns:a="http://schemas.openxmlformats.org/drawingml/2006/main" xmlns:r="http://schemas.openxmlformats.org/officeDocument/2006/relationships" xmlns:p="http://schemas.openxmlformats.org/presentationml/2006/main">
   <p:cSld>
@@ -9143,8 +9231,8 @@
         </p:blipFill>
         <p:spPr>
           <a:xfrm>
-            <a:off x="331785" y="1327263"/>
-            <a:ext cx="3698039" cy="2517222"/>
+            <a:off x="62837" y="1144192"/>
+            <a:ext cx="3966988" cy="2700293"/>
           </a:xfrm>
           <a:prstGeom prst="rect">
             <a:avLst/>
@@ -9166,8 +9254,8 @@
         </p:blipFill>
         <p:spPr>
           <a:xfrm>
-            <a:off x="2532931" y="3991436"/>
-            <a:ext cx="4604798" cy="2816505"/>
+            <a:off x="2292676" y="3844486"/>
+            <a:ext cx="4845053" cy="2963456"/>
           </a:xfrm>
           <a:prstGeom prst="rect">
             <a:avLst/>
@@ -9189,8 +9277,8 @@
         </p:blipFill>
         <p:spPr>
           <a:xfrm>
-            <a:off x="4835330" y="1327262"/>
-            <a:ext cx="4154151" cy="2517223"/>
+            <a:off x="4678770" y="1144192"/>
+            <a:ext cx="4456270" cy="2700293"/>
           </a:xfrm>
           <a:prstGeom prst="rect">
             <a:avLst/>
@@ -9573,6 +9661,79 @@
           </a:p>
         </p:txBody>
       </p:sp>
+      <p:sp>
+        <p:nvSpPr>
+          <p:cNvPr id="8" name="TextBox 7"/>
+          <p:cNvSpPr txBox="1"/>
+          <p:nvPr/>
+        </p:nvSpPr>
+        <p:spPr>
+          <a:xfrm>
+            <a:off x="4072896" y="6508004"/>
+            <a:ext cx="5071104" cy="338554"/>
+          </a:xfrm>
+          <a:prstGeom prst="rect">
+            <a:avLst/>
+          </a:prstGeom>
+          <a:noFill/>
+        </p:spPr>
+        <p:txBody>
+          <a:bodyPr wrap="square" rtlCol="0">
+            <a:spAutoFit/>
+          </a:bodyPr>
+          <a:lstStyle/>
+          <a:p>
+            <a:pPr algn="r"/>
+            <a:r>
+              <a:rPr lang="en-US" sz="1600" i="1" dirty="0" smtClean="0">
+                <a:solidFill>
+                  <a:schemeClr val="bg1">
+                    <a:lumMod val="50000"/>
+                  </a:schemeClr>
+                </a:solidFill>
+              </a:rPr>
+              <a:t>https://</a:t>
+            </a:r>
+            <a:r>
+              <a:rPr lang="en-US" sz="1600" i="1" dirty="0" err="1" smtClean="0">
+                <a:solidFill>
+                  <a:schemeClr val="bg1">
+                    <a:lumMod val="50000"/>
+                  </a:schemeClr>
+                </a:solidFill>
+              </a:rPr>
+              <a:t>shiny.rstudio.com</a:t>
+            </a:r>
+            <a:r>
+              <a:rPr lang="en-US" sz="1600" i="1" dirty="0" smtClean="0">
+                <a:solidFill>
+                  <a:schemeClr val="bg1">
+                    <a:lumMod val="50000"/>
+                  </a:schemeClr>
+                </a:solidFill>
+              </a:rPr>
+              <a:t>/articles/reactivity-</a:t>
+            </a:r>
+            <a:r>
+              <a:rPr lang="en-US" sz="1600" i="1" dirty="0" err="1" smtClean="0">
+                <a:solidFill>
+                  <a:schemeClr val="bg1">
+                    <a:lumMod val="50000"/>
+                  </a:schemeClr>
+                </a:solidFill>
+              </a:rPr>
+              <a:t>overview.html</a:t>
+            </a:r>
+            <a:endParaRPr lang="en-US" sz="1600" i="1" dirty="0">
+              <a:solidFill>
+                <a:schemeClr val="bg1">
+                  <a:lumMod val="50000"/>
+                </a:schemeClr>
+              </a:solidFill>
+            </a:endParaRPr>
+          </a:p>
+        </p:txBody>
+      </p:sp>
     </p:spTree>
     <p:extLst>
       <p:ext uri="{BB962C8B-B14F-4D97-AF65-F5344CB8AC3E}">
@@ -9691,6 +9852,79 @@
           </a:prstGeom>
         </p:spPr>
       </p:pic>
+      <p:sp>
+        <p:nvSpPr>
+          <p:cNvPr id="12" name="TextBox 11"/>
+          <p:cNvSpPr txBox="1"/>
+          <p:nvPr/>
+        </p:nvSpPr>
+        <p:spPr>
+          <a:xfrm>
+            <a:off x="4072896" y="6508004"/>
+            <a:ext cx="5071104" cy="338554"/>
+          </a:xfrm>
+          <a:prstGeom prst="rect">
+            <a:avLst/>
+          </a:prstGeom>
+          <a:noFill/>
+        </p:spPr>
+        <p:txBody>
+          <a:bodyPr wrap="square" rtlCol="0">
+            <a:spAutoFit/>
+          </a:bodyPr>
+          <a:lstStyle/>
+          <a:p>
+            <a:pPr algn="r"/>
+            <a:r>
+              <a:rPr lang="en-US" sz="1600" i="1" dirty="0" smtClean="0">
+                <a:solidFill>
+                  <a:schemeClr val="bg1">
+                    <a:lumMod val="50000"/>
+                  </a:schemeClr>
+                </a:solidFill>
+              </a:rPr>
+              <a:t>https://</a:t>
+            </a:r>
+            <a:r>
+              <a:rPr lang="en-US" sz="1600" i="1" dirty="0" err="1" smtClean="0">
+                <a:solidFill>
+                  <a:schemeClr val="bg1">
+                    <a:lumMod val="50000"/>
+                  </a:schemeClr>
+                </a:solidFill>
+              </a:rPr>
+              <a:t>shiny.rstudio.com</a:t>
+            </a:r>
+            <a:r>
+              <a:rPr lang="en-US" sz="1600" i="1" dirty="0" smtClean="0">
+                <a:solidFill>
+                  <a:schemeClr val="bg1">
+                    <a:lumMod val="50000"/>
+                  </a:schemeClr>
+                </a:solidFill>
+              </a:rPr>
+              <a:t>/articles/reactivity-</a:t>
+            </a:r>
+            <a:r>
+              <a:rPr lang="en-US" sz="1600" i="1" dirty="0" err="1" smtClean="0">
+                <a:solidFill>
+                  <a:schemeClr val="bg1">
+                    <a:lumMod val="50000"/>
+                  </a:schemeClr>
+                </a:solidFill>
+              </a:rPr>
+              <a:t>overview.html</a:t>
+            </a:r>
+            <a:endParaRPr lang="en-US" sz="1600" i="1" dirty="0">
+              <a:solidFill>
+                <a:schemeClr val="bg1">
+                  <a:lumMod val="50000"/>
+                </a:schemeClr>
+              </a:solidFill>
+            </a:endParaRPr>
+          </a:p>
+        </p:txBody>
+      </p:sp>
     </p:spTree>
     <p:extLst>
       <p:ext uri="{BB962C8B-B14F-4D97-AF65-F5344CB8AC3E}">
@@ -9801,7 +10035,7 @@
         </p:blipFill>
         <p:spPr>
           <a:xfrm>
-            <a:off x="5181599" y="4382388"/>
+            <a:off x="5024719" y="3695873"/>
             <a:ext cx="3662081" cy="2321972"/>
           </a:xfrm>
           <a:prstGeom prst="rect">
@@ -9809,6 +10043,79 @@
           </a:prstGeom>
         </p:spPr>
       </p:pic>
+      <p:sp>
+        <p:nvSpPr>
+          <p:cNvPr id="7" name="TextBox 6"/>
+          <p:cNvSpPr txBox="1"/>
+          <p:nvPr/>
+        </p:nvSpPr>
+        <p:spPr>
+          <a:xfrm>
+            <a:off x="4072896" y="6508004"/>
+            <a:ext cx="5071104" cy="338554"/>
+          </a:xfrm>
+          <a:prstGeom prst="rect">
+            <a:avLst/>
+          </a:prstGeom>
+          <a:noFill/>
+        </p:spPr>
+        <p:txBody>
+          <a:bodyPr wrap="square" rtlCol="0">
+            <a:spAutoFit/>
+          </a:bodyPr>
+          <a:lstStyle/>
+          <a:p>
+            <a:pPr algn="r"/>
+            <a:r>
+              <a:rPr lang="en-US" sz="1600" i="1" dirty="0" smtClean="0">
+                <a:solidFill>
+                  <a:schemeClr val="bg1">
+                    <a:lumMod val="50000"/>
+                  </a:schemeClr>
+                </a:solidFill>
+              </a:rPr>
+              <a:t>https://</a:t>
+            </a:r>
+            <a:r>
+              <a:rPr lang="en-US" sz="1600" i="1" dirty="0" err="1" smtClean="0">
+                <a:solidFill>
+                  <a:schemeClr val="bg1">
+                    <a:lumMod val="50000"/>
+                  </a:schemeClr>
+                </a:solidFill>
+              </a:rPr>
+              <a:t>shiny.rstudio.com</a:t>
+            </a:r>
+            <a:r>
+              <a:rPr lang="en-US" sz="1600" i="1" dirty="0" smtClean="0">
+                <a:solidFill>
+                  <a:schemeClr val="bg1">
+                    <a:lumMod val="50000"/>
+                  </a:schemeClr>
+                </a:solidFill>
+              </a:rPr>
+              <a:t>/articles/reactivity-</a:t>
+            </a:r>
+            <a:r>
+              <a:rPr lang="en-US" sz="1600" i="1" dirty="0" err="1" smtClean="0">
+                <a:solidFill>
+                  <a:schemeClr val="bg1">
+                    <a:lumMod val="50000"/>
+                  </a:schemeClr>
+                </a:solidFill>
+              </a:rPr>
+              <a:t>overview.html</a:t>
+            </a:r>
+            <a:endParaRPr lang="en-US" sz="1600" i="1" dirty="0">
+              <a:solidFill>
+                <a:schemeClr val="bg1">
+                  <a:lumMod val="50000"/>
+                </a:schemeClr>
+              </a:solidFill>
+            </a:endParaRPr>
+          </a:p>
+        </p:txBody>
+      </p:sp>
     </p:spTree>
     <p:extLst>
       <p:ext uri="{BB962C8B-B14F-4D97-AF65-F5344CB8AC3E}">
@@ -9934,6 +10241,79 @@
           </a:prstGeom>
         </p:spPr>
       </p:pic>
+      <p:sp>
+        <p:nvSpPr>
+          <p:cNvPr id="10" name="TextBox 9"/>
+          <p:cNvSpPr txBox="1"/>
+          <p:nvPr/>
+        </p:nvSpPr>
+        <p:spPr>
+          <a:xfrm>
+            <a:off x="4072896" y="6508004"/>
+            <a:ext cx="5071104" cy="338554"/>
+          </a:xfrm>
+          <a:prstGeom prst="rect">
+            <a:avLst/>
+          </a:prstGeom>
+          <a:noFill/>
+        </p:spPr>
+        <p:txBody>
+          <a:bodyPr wrap="square" rtlCol="0">
+            <a:spAutoFit/>
+          </a:bodyPr>
+          <a:lstStyle/>
+          <a:p>
+            <a:pPr algn="r"/>
+            <a:r>
+              <a:rPr lang="en-US" sz="1600" i="1" dirty="0" smtClean="0">
+                <a:solidFill>
+                  <a:schemeClr val="bg1">
+                    <a:lumMod val="50000"/>
+                  </a:schemeClr>
+                </a:solidFill>
+              </a:rPr>
+              <a:t>https://</a:t>
+            </a:r>
+            <a:r>
+              <a:rPr lang="en-US" sz="1600" i="1" dirty="0" err="1" smtClean="0">
+                <a:solidFill>
+                  <a:schemeClr val="bg1">
+                    <a:lumMod val="50000"/>
+                  </a:schemeClr>
+                </a:solidFill>
+              </a:rPr>
+              <a:t>shiny.rstudio.com</a:t>
+            </a:r>
+            <a:r>
+              <a:rPr lang="en-US" sz="1600" i="1" dirty="0" smtClean="0">
+                <a:solidFill>
+                  <a:schemeClr val="bg1">
+                    <a:lumMod val="50000"/>
+                  </a:schemeClr>
+                </a:solidFill>
+              </a:rPr>
+              <a:t>/articles/reactivity-</a:t>
+            </a:r>
+            <a:r>
+              <a:rPr lang="en-US" sz="1600" i="1" dirty="0" err="1" smtClean="0">
+                <a:solidFill>
+                  <a:schemeClr val="bg1">
+                    <a:lumMod val="50000"/>
+                  </a:schemeClr>
+                </a:solidFill>
+              </a:rPr>
+              <a:t>overview.html</a:t>
+            </a:r>
+            <a:endParaRPr lang="en-US" sz="1600" i="1" dirty="0">
+              <a:solidFill>
+                <a:schemeClr val="bg1">
+                  <a:lumMod val="50000"/>
+                </a:schemeClr>
+              </a:solidFill>
+            </a:endParaRPr>
+          </a:p>
+        </p:txBody>
+      </p:sp>
     </p:spTree>
     <p:extLst>
       <p:ext uri="{BB962C8B-B14F-4D97-AF65-F5344CB8AC3E}">
@@ -10012,7 +10392,7 @@
         <p:spPr/>
         <p:txBody>
           <a:bodyPr>
-            <a:normAutofit fontScale="92500" lnSpcReduction="20000"/>
+            <a:normAutofit fontScale="85000" lnSpcReduction="20000"/>
           </a:bodyPr>
           <a:lstStyle/>
           <a:p>
@@ -10052,7 +10432,7 @@
             </a:pPr>
             <a:r>
               <a:rPr lang="en-US" dirty="0" smtClean="0"/>
-              <a:t>Examples</a:t>
+              <a:t>Structure of an Application</a:t>
             </a:r>
           </a:p>
           <a:p>
@@ -10062,7 +10442,7 @@
             </a:pPr>
             <a:r>
               <a:rPr lang="en-US" dirty="0" smtClean="0"/>
-              <a:t>Structure of an Application</a:t>
+              <a:t>Input &amp; Outputs</a:t>
             </a:r>
           </a:p>
           <a:p>
@@ -10072,7 +10452,7 @@
             </a:pPr>
             <a:r>
               <a:rPr lang="en-US" dirty="0" smtClean="0"/>
-              <a:t>Basic: Example 1</a:t>
+              <a:t>Example 1</a:t>
             </a:r>
           </a:p>
           <a:p>
@@ -10092,7 +10472,17 @@
             </a:pPr>
             <a:r>
               <a:rPr lang="en-US" dirty="0" smtClean="0"/>
-              <a:t>Advanced: Example 2</a:t>
+              <a:t>Example 2</a:t>
+            </a:r>
+          </a:p>
+          <a:p>
+            <a:pPr marL="514350" indent="-514350">
+              <a:buFont typeface="+mj-lt"/>
+              <a:buAutoNum type="arabicPeriod"/>
+            </a:pPr>
+            <a:r>
+              <a:rPr lang="en-US" dirty="0" smtClean="0"/>
+              <a:t>Reactivity</a:t>
             </a:r>
           </a:p>
           <a:p>
@@ -10242,6 +10632,79 @@
           </a:prstGeom>
         </p:spPr>
       </p:pic>
+      <p:sp>
+        <p:nvSpPr>
+          <p:cNvPr id="7" name="TextBox 6"/>
+          <p:cNvSpPr txBox="1"/>
+          <p:nvPr/>
+        </p:nvSpPr>
+        <p:spPr>
+          <a:xfrm>
+            <a:off x="4072896" y="6508004"/>
+            <a:ext cx="5071104" cy="338554"/>
+          </a:xfrm>
+          <a:prstGeom prst="rect">
+            <a:avLst/>
+          </a:prstGeom>
+          <a:noFill/>
+        </p:spPr>
+        <p:txBody>
+          <a:bodyPr wrap="square" rtlCol="0">
+            <a:spAutoFit/>
+          </a:bodyPr>
+          <a:lstStyle/>
+          <a:p>
+            <a:pPr algn="r"/>
+            <a:r>
+              <a:rPr lang="en-US" sz="1600" i="1" dirty="0" smtClean="0">
+                <a:solidFill>
+                  <a:schemeClr val="bg1">
+                    <a:lumMod val="50000"/>
+                  </a:schemeClr>
+                </a:solidFill>
+              </a:rPr>
+              <a:t>https://</a:t>
+            </a:r>
+            <a:r>
+              <a:rPr lang="en-US" sz="1600" i="1" dirty="0" err="1" smtClean="0">
+                <a:solidFill>
+                  <a:schemeClr val="bg1">
+                    <a:lumMod val="50000"/>
+                  </a:schemeClr>
+                </a:solidFill>
+              </a:rPr>
+              <a:t>shiny.rstudio.com</a:t>
+            </a:r>
+            <a:r>
+              <a:rPr lang="en-US" sz="1600" i="1" dirty="0" smtClean="0">
+                <a:solidFill>
+                  <a:schemeClr val="bg1">
+                    <a:lumMod val="50000"/>
+                  </a:schemeClr>
+                </a:solidFill>
+              </a:rPr>
+              <a:t>/articles/reactivity-</a:t>
+            </a:r>
+            <a:r>
+              <a:rPr lang="en-US" sz="1600" i="1" dirty="0" err="1" smtClean="0">
+                <a:solidFill>
+                  <a:schemeClr val="bg1">
+                    <a:lumMod val="50000"/>
+                  </a:schemeClr>
+                </a:solidFill>
+              </a:rPr>
+              <a:t>overview.html</a:t>
+            </a:r>
+            <a:endParaRPr lang="en-US" sz="1600" i="1" dirty="0">
+              <a:solidFill>
+                <a:schemeClr val="bg1">
+                  <a:lumMod val="50000"/>
+                </a:schemeClr>
+              </a:solidFill>
+            </a:endParaRPr>
+          </a:p>
+        </p:txBody>
+      </p:sp>
     </p:spTree>
     <p:extLst>
       <p:ext uri="{BB962C8B-B14F-4D97-AF65-F5344CB8AC3E}">
@@ -10289,6 +10752,120 @@
             <p:ph type="title"/>
           </p:nvPr>
         </p:nvSpPr>
+        <p:spPr>
+          <a:xfrm>
+            <a:off x="457200" y="34356"/>
+            <a:ext cx="8229600" cy="1143000"/>
+          </a:xfrm>
+        </p:spPr>
+        <p:txBody>
+          <a:bodyPr/>
+          <a:lstStyle/>
+          <a:p>
+            <a:r>
+              <a:rPr lang="en-US" dirty="0" smtClean="0"/>
+              <a:t>Application Deployment</a:t>
+            </a:r>
+            <a:endParaRPr lang="en-US" dirty="0"/>
+          </a:p>
+        </p:txBody>
+      </p:sp>
+      <p:sp>
+        <p:nvSpPr>
+          <p:cNvPr id="5" name="Content Placeholder 2"/>
+          <p:cNvSpPr>
+            <a:spLocks noGrp="1"/>
+          </p:cNvSpPr>
+          <p:nvPr>
+            <p:ph idx="1"/>
+          </p:nvPr>
+        </p:nvSpPr>
+        <p:spPr>
+          <a:xfrm>
+            <a:off x="457200" y="1600200"/>
+            <a:ext cx="8229600" cy="4525963"/>
+          </a:xfrm>
+        </p:spPr>
+        <p:txBody>
+          <a:bodyPr>
+            <a:normAutofit/>
+          </a:bodyPr>
+          <a:lstStyle/>
+          <a:p>
+            <a:r>
+              <a:rPr lang="en-US" dirty="0" err="1" smtClean="0"/>
+              <a:t>Localhost</a:t>
+            </a:r>
+            <a:endParaRPr lang="en-US" dirty="0" smtClean="0"/>
+          </a:p>
+          <a:p>
+            <a:r>
+              <a:rPr lang="en-US" dirty="0" smtClean="0"/>
+              <a:t>Shiny Server</a:t>
+            </a:r>
+          </a:p>
+          <a:p>
+            <a:r>
+              <a:rPr lang="en-US" dirty="0" err="1" smtClean="0"/>
+              <a:t>Shinyapps.io</a:t>
+            </a:r>
+            <a:endParaRPr lang="en-US" dirty="0" smtClean="0"/>
+          </a:p>
+          <a:p>
+            <a:pPr marL="628650" lvl="1" indent="0">
+              <a:buNone/>
+            </a:pPr>
+            <a:endParaRPr lang="en-US" sz="1600" dirty="0" smtClean="0"/>
+          </a:p>
+        </p:txBody>
+      </p:sp>
+    </p:spTree>
+    <p:extLst>
+      <p:ext uri="{BB962C8B-B14F-4D97-AF65-F5344CB8AC3E}">
+        <p14:creationId xmlns:p14="http://schemas.microsoft.com/office/powerpoint/2010/main" val="3766032500"/>
+      </p:ext>
+    </p:extLst>
+  </p:cSld>
+  <p:clrMapOvr>
+    <a:masterClrMapping/>
+  </p:clrMapOvr>
+  <p:timing>
+    <p:tnLst>
+      <p:par>
+        <p:cTn xmlns:p14="http://schemas.microsoft.com/office/powerpoint/2010/main" id="1" dur="indefinite" restart="never" nodeType="tmRoot"/>
+      </p:par>
+    </p:tnLst>
+  </p:timing>
+</p:sld>
+</file>
+
+<file path=ppt/slides/slide22.xml><?xml version="1.0" encoding="utf-8"?>
+<p:sld xmlns:a="http://schemas.openxmlformats.org/drawingml/2006/main" xmlns:r="http://schemas.openxmlformats.org/officeDocument/2006/relationships" xmlns:p="http://schemas.openxmlformats.org/presentationml/2006/main">
+  <p:cSld>
+    <p:spTree>
+      <p:nvGrpSpPr>
+        <p:cNvPr id="1" name=""/>
+        <p:cNvGrpSpPr/>
+        <p:nvPr/>
+      </p:nvGrpSpPr>
+      <p:grpSpPr>
+        <a:xfrm>
+          <a:off x="0" y="0"/>
+          <a:ext cx="0" cy="0"/>
+          <a:chOff x="0" y="0"/>
+          <a:chExt cx="0" cy="0"/>
+        </a:xfrm>
+      </p:grpSpPr>
+      <p:sp>
+        <p:nvSpPr>
+          <p:cNvPr id="2" name="Title 1"/>
+          <p:cNvSpPr>
+            <a:spLocks noGrp="1"/>
+          </p:cNvSpPr>
+          <p:nvPr>
+            <p:ph type="title"/>
+          </p:nvPr>
+        </p:nvSpPr>
         <p:spPr/>
         <p:txBody>
           <a:bodyPr/>
@@ -10763,6 +11340,188 @@
           </a:graphicData>
         </a:graphic>
       </p:graphicFrame>
+      <p:sp>
+        <p:nvSpPr>
+          <p:cNvPr id="6" name="Right Brace 5"/>
+          <p:cNvSpPr/>
+          <p:nvPr/>
+        </p:nvSpPr>
+        <p:spPr>
+          <a:xfrm rot="5400000">
+            <a:off x="2805798" y="1948494"/>
+            <a:ext cx="594917" cy="5806246"/>
+          </a:xfrm>
+          <a:prstGeom prst="rightBrace">
+            <a:avLst/>
+          </a:prstGeom>
+        </p:spPr>
+        <p:style>
+          <a:lnRef idx="2">
+            <a:schemeClr val="accent1"/>
+          </a:lnRef>
+          <a:fillRef idx="0">
+            <a:schemeClr val="accent1"/>
+          </a:fillRef>
+          <a:effectRef idx="1">
+            <a:schemeClr val="accent1"/>
+          </a:effectRef>
+          <a:fontRef idx="minor">
+            <a:schemeClr val="tx1"/>
+          </a:fontRef>
+        </p:style>
+        <p:txBody>
+          <a:bodyPr rtlCol="0" anchor="ctr"/>
+          <a:lstStyle/>
+          <a:p>
+            <a:pPr algn="ctr"/>
+            <a:endParaRPr lang="en-US" dirty="0"/>
+          </a:p>
+        </p:txBody>
+      </p:sp>
+      <p:sp>
+        <p:nvSpPr>
+          <p:cNvPr id="7" name="Right Brace 6"/>
+          <p:cNvSpPr/>
+          <p:nvPr/>
+        </p:nvSpPr>
+        <p:spPr>
+          <a:xfrm rot="5400000">
+            <a:off x="7243814" y="3469125"/>
+            <a:ext cx="594917" cy="2764986"/>
+          </a:xfrm>
+          <a:prstGeom prst="rightBrace">
+            <a:avLst/>
+          </a:prstGeom>
+        </p:spPr>
+        <p:style>
+          <a:lnRef idx="2">
+            <a:schemeClr val="accent1"/>
+          </a:lnRef>
+          <a:fillRef idx="0">
+            <a:schemeClr val="accent1"/>
+          </a:fillRef>
+          <a:effectRef idx="1">
+            <a:schemeClr val="accent1"/>
+          </a:effectRef>
+          <a:fontRef idx="minor">
+            <a:schemeClr val="tx1"/>
+          </a:fontRef>
+        </p:style>
+        <p:txBody>
+          <a:bodyPr rtlCol="0" anchor="ctr"/>
+          <a:lstStyle/>
+          <a:p>
+            <a:pPr algn="ctr"/>
+            <a:endParaRPr lang="en-US" dirty="0"/>
+          </a:p>
+        </p:txBody>
+      </p:sp>
+      <p:sp>
+        <p:nvSpPr>
+          <p:cNvPr id="8" name="TextBox 7"/>
+          <p:cNvSpPr txBox="1"/>
+          <p:nvPr/>
+        </p:nvSpPr>
+        <p:spPr>
+          <a:xfrm>
+            <a:off x="1521188" y="5183188"/>
+            <a:ext cx="3169510" cy="923330"/>
+          </a:xfrm>
+          <a:prstGeom prst="rect">
+            <a:avLst/>
+          </a:prstGeom>
+          <a:noFill/>
+          <a:ln>
+            <a:solidFill>
+              <a:schemeClr val="tx2"/>
+            </a:solidFill>
+          </a:ln>
+        </p:spPr>
+        <p:txBody>
+          <a:bodyPr wrap="square" rtlCol="0">
+            <a:spAutoFit/>
+          </a:bodyPr>
+          <a:lstStyle/>
+          <a:p>
+            <a:pPr marL="285750" indent="-285750">
+              <a:buFont typeface="Arial"/>
+              <a:buChar char="•"/>
+            </a:pPr>
+            <a:r>
+              <a:rPr lang="en-US" dirty="0" smtClean="0"/>
+              <a:t>Backend Processing</a:t>
+            </a:r>
+          </a:p>
+          <a:p>
+            <a:pPr marL="285750" indent="-285750">
+              <a:buFont typeface="Arial"/>
+              <a:buChar char="•"/>
+            </a:pPr>
+            <a:r>
+              <a:rPr lang="en-US" dirty="0" smtClean="0"/>
+              <a:t>Data Cleaning / Preparation</a:t>
+            </a:r>
+          </a:p>
+          <a:p>
+            <a:pPr marL="285750" indent="-285750">
+              <a:buFont typeface="Arial"/>
+              <a:buChar char="•"/>
+            </a:pPr>
+            <a:r>
+              <a:rPr lang="en-US" dirty="0" smtClean="0"/>
+              <a:t>Automation</a:t>
+            </a:r>
+          </a:p>
+        </p:txBody>
+      </p:sp>
+      <p:sp>
+        <p:nvSpPr>
+          <p:cNvPr id="9" name="TextBox 8"/>
+          <p:cNvSpPr txBox="1"/>
+          <p:nvPr/>
+        </p:nvSpPr>
+        <p:spPr>
+          <a:xfrm>
+            <a:off x="6158778" y="5160303"/>
+            <a:ext cx="2764987" cy="923330"/>
+          </a:xfrm>
+          <a:prstGeom prst="rect">
+            <a:avLst/>
+          </a:prstGeom>
+          <a:noFill/>
+          <a:ln>
+            <a:solidFill>
+              <a:schemeClr val="tx2"/>
+            </a:solidFill>
+          </a:ln>
+        </p:spPr>
+        <p:txBody>
+          <a:bodyPr wrap="square" rtlCol="0">
+            <a:spAutoFit/>
+          </a:bodyPr>
+          <a:lstStyle/>
+          <a:p>
+            <a:pPr marL="285750" indent="-285750">
+              <a:buFont typeface="Arial"/>
+              <a:buChar char="•"/>
+            </a:pPr>
+            <a:r>
+              <a:rPr lang="en-US" dirty="0" smtClean="0"/>
+              <a:t>Presentation Layer</a:t>
+            </a:r>
+          </a:p>
+          <a:p>
+            <a:pPr marL="285750" indent="-285750">
+              <a:buFont typeface="Arial"/>
+              <a:buChar char="•"/>
+            </a:pPr>
+            <a:r>
+              <a:rPr lang="en-US" dirty="0" smtClean="0"/>
+              <a:t>Keep data processing lightweight</a:t>
+            </a:r>
+          </a:p>
+        </p:txBody>
+      </p:sp>
     </p:spTree>
     <p:extLst>
       <p:ext uri="{BB962C8B-B14F-4D97-AF65-F5344CB8AC3E}">
@@ -10896,7 +11655,7 @@
         </p:nvSpPr>
         <p:spPr>
           <a:xfrm>
-            <a:off x="0" y="5896750"/>
+            <a:off x="0" y="6537502"/>
             <a:ext cx="9144000" cy="307777"/>
           </a:xfrm>
           <a:prstGeom prst="rect">
@@ -10912,10 +11671,18 @@
           <a:p>
             <a:pPr algn="r"/>
             <a:r>
-              <a:rPr lang="en-US" sz="1400" i="1" dirty="0" smtClean="0"/>
+              <a:rPr lang="en-US" sz="1400" i="1" dirty="0" smtClean="0">
+                <a:solidFill>
+                  <a:srgbClr val="7F7F7F"/>
+                </a:solidFill>
+              </a:rPr>
               <a:t>Shiny Example "01_hello”</a:t>
             </a:r>
-            <a:endParaRPr lang="en-US" sz="1400" i="1" dirty="0"/>
+            <a:endParaRPr lang="en-US" sz="1400" i="1" dirty="0">
+              <a:solidFill>
+                <a:srgbClr val="7F7F7F"/>
+              </a:solidFill>
+            </a:endParaRPr>
           </a:p>
         </p:txBody>
       </p:sp>
@@ -11054,7 +11821,7 @@
         <p:spPr>
           <a:xfrm>
             <a:off x="0" y="6432484"/>
-            <a:ext cx="9144000" cy="307777"/>
+            <a:ext cx="9144000" cy="338554"/>
           </a:xfrm>
           <a:prstGeom prst="rect">
             <a:avLst/>
@@ -11069,26 +11836,50 @@
           <a:p>
             <a:pPr algn="r"/>
             <a:r>
-              <a:rPr lang="en-US" sz="1400" i="1" dirty="0" smtClean="0"/>
+              <a:rPr lang="en-US" sz="1600" i="1" dirty="0" smtClean="0">
+                <a:solidFill>
+                  <a:srgbClr val="7F7F7F"/>
+                </a:solidFill>
+              </a:rPr>
               <a:t>https://</a:t>
             </a:r>
             <a:r>
-              <a:rPr lang="en-US" sz="1400" i="1" dirty="0" err="1" smtClean="0"/>
+              <a:rPr lang="en-US" sz="1600" i="1" dirty="0" err="1" smtClean="0">
+                <a:solidFill>
+                  <a:srgbClr val="7F7F7F"/>
+                </a:solidFill>
+              </a:rPr>
               <a:t>gallery.shinyapps.io</a:t>
             </a:r>
             <a:r>
-              <a:rPr lang="en-US" sz="1400" i="1" dirty="0" smtClean="0"/>
+              <a:rPr lang="en-US" sz="1600" i="1" dirty="0" smtClean="0">
+                <a:solidFill>
+                  <a:srgbClr val="7F7F7F"/>
+                </a:solidFill>
+              </a:rPr>
               <a:t>/</a:t>
             </a:r>
             <a:r>
-              <a:rPr lang="en-US" sz="1400" i="1" dirty="0" err="1" smtClean="0"/>
+              <a:rPr lang="en-US" sz="1600" i="1" dirty="0" err="1" smtClean="0">
+                <a:solidFill>
+                  <a:srgbClr val="7F7F7F"/>
+                </a:solidFill>
+              </a:rPr>
               <a:t>TSupplyDemand</a:t>
             </a:r>
             <a:r>
-              <a:rPr lang="en-US" sz="1400" i="1" dirty="0" smtClean="0"/>
+              <a:rPr lang="en-US" sz="1600" i="1" dirty="0" smtClean="0">
+                <a:solidFill>
+                  <a:srgbClr val="7F7F7F"/>
+                </a:solidFill>
+              </a:rPr>
               <a:t>/</a:t>
             </a:r>
-            <a:endParaRPr lang="en-US" sz="1400" i="1" dirty="0"/>
+            <a:endParaRPr lang="en-US" sz="1600" i="1" dirty="0">
+              <a:solidFill>
+                <a:srgbClr val="7F7F7F"/>
+              </a:solidFill>
+            </a:endParaRPr>
           </a:p>
         </p:txBody>
       </p:sp>

</xml_diff>